<commit_message>
Update Air Quality Index Analysis mini project presentation
</commit_message>
<xml_diff>
--- a/7.Air Quality Index Analysis.(Mini Project)/Real-time_AQI_Data_Analytics.pptx
+++ b/7.Air Quality Index Analysis.(Mini Project)/Real-time_AQI_Data_Analytics.pptx
@@ -1,20 +1,20 @@
 
 <file path=ppt/presentation.xml><?xml version="1.0" encoding="utf-8"?>
-<p:presentation xmlns:a="http://schemas.openxmlformats.org/drawingml/2006/main" xmlns:r="http://schemas.openxmlformats.org/officeDocument/2006/relationships" xmlns:p="http://schemas.openxmlformats.org/presentationml/2006/main" saveSubsetFonts="1" autoCompressPictures="0">
+<p:presentation xmlns:a="http://schemas.openxmlformats.org/drawingml/2006/main" xmlns:r="http://schemas.openxmlformats.org/officeDocument/2006/relationships" xmlns:p="http://schemas.openxmlformats.org/presentationml/2006/main" autoCompressPictures="0">
   <p:sldMasterIdLst>
-    <p:sldMasterId id="2147483732" r:id="rId1"/>
+    <p:sldMasterId id="2147483648" r:id="rId1"/>
   </p:sldMasterIdLst>
   <p:sldIdLst>
-    <p:sldId id="256" r:id="rId2"/>
-    <p:sldId id="257" r:id="rId3"/>
-    <p:sldId id="258" r:id="rId4"/>
-    <p:sldId id="265" r:id="rId5"/>
-    <p:sldId id="262" r:id="rId6"/>
-    <p:sldId id="260" r:id="rId7"/>
-    <p:sldId id="259" r:id="rId8"/>
-    <p:sldId id="264" r:id="rId9"/>
-    <p:sldId id="266" r:id="rId10"/>
-    <p:sldId id="267" r:id="rId11"/>
+    <p:sldId id="256" r:id="rId3"/>
+    <p:sldId id="257" r:id="rId4"/>
+    <p:sldId id="258" r:id="rId5"/>
+    <p:sldId id="265" r:id="rId6"/>
+    <p:sldId id="262" r:id="rId7"/>
+    <p:sldId id="260" r:id="rId8"/>
+    <p:sldId id="259" r:id="rId9"/>
+    <p:sldId id="264" r:id="rId10"/>
+    <p:sldId id="266" r:id="rId11"/>
+    <p:sldId id="267" r:id="rId12"/>
   </p:sldIdLst>
   <p:sldSz cx="9144000" cy="6858000" type="screen4x3"/>
   <p:notesSz cx="6858000" cy="9144000"/>
@@ -134,12 +134,12 @@
     </p:ext>
     <p:ext uri="{EFAFB233-063F-42B5-8137-9DF3F51BA10A}">
       <p15:sldGuideLst xmlns:p15="http://schemas.microsoft.com/office/powerpoint/2012/main">
-        <p15:guide id="1" orient="horz" pos="2160">
+        <p15:guide id="1" orient="horz" pos="2160" userDrawn="1">
           <p15:clr>
             <a:srgbClr val="A4A3A4"/>
           </p15:clr>
         </p15:guide>
-        <p15:guide id="2" pos="2880">
+        <p15:guide id="2" pos="2880" userDrawn="1">
           <p15:clr>
             <a:srgbClr val="A4A3A4"/>
           </p15:clr>
@@ -151,7 +151,7 @@
 </file>
 
 <file path=ppt/slideLayouts/slideLayout1.xml><?xml version="1.0" encoding="utf-8"?>
-<p:sldLayout xmlns:a="http://schemas.openxmlformats.org/drawingml/2006/main" xmlns:r="http://schemas.openxmlformats.org/officeDocument/2006/relationships" xmlns:p="http://schemas.openxmlformats.org/presentationml/2006/main" showMasterSp="0" type="title" preserve="1">
+<p:sldLayout xmlns:a="http://schemas.openxmlformats.org/drawingml/2006/main" xmlns:r="http://schemas.openxmlformats.org/officeDocument/2006/relationships" xmlns:p="http://schemas.openxmlformats.org/presentationml/2006/main" type="title" preserve="1" showMasterSp="0">
   <p:cSld name="Title Slide">
     <p:spTree>
       <p:nvGrpSpPr>
@@ -262,7 +262,9 @@
               </a:extLst>
             </a:blip>
             <a:srcRect l="-2" r="47959"/>
-            <a:stretch/>
+            <a:stretch>
+              <a:fillRect/>
+            </a:stretch>
           </p:blipFill>
           <p:spPr>
             <a:xfrm>
@@ -291,7 +293,9 @@
               </a:extLst>
             </a:blip>
             <a:srcRect l="-2" r="47959"/>
-            <a:stretch/>
+            <a:stretch>
+              <a:fillRect/>
+            </a:stretch>
           </p:blipFill>
           <p:spPr>
             <a:xfrm>
@@ -481,7 +485,6 @@
           <a:p>
             <a:fld id="{5BCAD085-E8A6-8845-BD4E-CB4CCA059FC4}" type="datetimeFigureOut">
               <a:rPr lang="en-US" smtClean="0"/>
-              <a:t>9/24/2025</a:t>
             </a:fld>
             <a:endParaRPr lang="en-US"/>
           </a:p>
@@ -533,7 +536,6 @@
           <a:p>
             <a:fld id="{C1FF6DA9-008F-8B48-92A6-B652298478BF}" type="slidenum">
               <a:rPr lang="en-US" smtClean="0"/>
-              <a:t>‹#›</a:t>
             </a:fld>
             <a:endParaRPr lang="en-US"/>
           </a:p>
@@ -571,11 +573,6 @@
         </p:style>
       </p:cxnSp>
     </p:spTree>
-    <p:extLst>
-      <p:ext uri="{BB962C8B-B14F-4D97-AF65-F5344CB8AC3E}">
-        <p14:creationId xmlns:p14="http://schemas.microsoft.com/office/powerpoint/2010/main" val="2566722910"/>
-      </p:ext>
-    </p:extLst>
   </p:cSld>
   <p:clrMapOvr>
     <a:masterClrMapping/>
@@ -785,6 +782,7 @@
               <a:rPr lang="en-US"/>
               <a:t>Click to edit Master text styles</a:t>
             </a:r>
+            <a:endParaRPr lang="en-US"/>
           </a:p>
         </p:txBody>
       </p:sp>
@@ -805,7 +803,6 @@
           <a:p>
             <a:fld id="{5BCAD085-E8A6-8845-BD4E-CB4CCA059FC4}" type="datetimeFigureOut">
               <a:rPr lang="en-US" smtClean="0"/>
-              <a:t>9/24/2025</a:t>
             </a:fld>
             <a:endParaRPr lang="en-US"/>
           </a:p>
@@ -847,18 +844,12 @@
           <a:p>
             <a:fld id="{C1FF6DA9-008F-8B48-92A6-B652298478BF}" type="slidenum">
               <a:rPr lang="en-US" smtClean="0"/>
-              <a:t>‹#›</a:t>
             </a:fld>
             <a:endParaRPr lang="en-US"/>
           </a:p>
         </p:txBody>
       </p:sp>
     </p:spTree>
-    <p:extLst>
-      <p:ext uri="{BB962C8B-B14F-4D97-AF65-F5344CB8AC3E}">
-        <p14:creationId xmlns:p14="http://schemas.microsoft.com/office/powerpoint/2010/main" val="1136428882"/>
-      </p:ext>
-    </p:extLst>
   </p:cSld>
   <p:clrMapOvr>
     <a:masterClrMapping/>
@@ -1033,6 +1024,7 @@
               <a:rPr lang="en-US"/>
               <a:t>Click to edit Master text styles</a:t>
             </a:r>
+            <a:endParaRPr lang="en-US"/>
           </a:p>
         </p:txBody>
       </p:sp>
@@ -1053,7 +1045,6 @@
           <a:p>
             <a:fld id="{5BCAD085-E8A6-8845-BD4E-CB4CCA059FC4}" type="datetimeFigureOut">
               <a:rPr lang="en-US" smtClean="0"/>
-              <a:t>9/24/2025</a:t>
             </a:fld>
             <a:endParaRPr lang="en-US"/>
           </a:p>
@@ -1095,7 +1086,6 @@
           <a:p>
             <a:fld id="{C1FF6DA9-008F-8B48-92A6-B652298478BF}" type="slidenum">
               <a:rPr lang="en-US" smtClean="0"/>
-              <a:t>‹#›</a:t>
             </a:fld>
             <a:endParaRPr lang="en-US"/>
           </a:p>
@@ -1133,11 +1123,6 @@
         </p:style>
       </p:cxnSp>
     </p:spTree>
-    <p:extLst>
-      <p:ext uri="{BB962C8B-B14F-4D97-AF65-F5344CB8AC3E}">
-        <p14:creationId xmlns:p14="http://schemas.microsoft.com/office/powerpoint/2010/main" val="2057870476"/>
-      </p:ext>
-    </p:extLst>
   </p:cSld>
   <p:clrMapOvr>
     <a:masterClrMapping/>
@@ -1253,6 +1238,7 @@
               <a:rPr lang="en-US"/>
               <a:t>Click to edit Master text styles</a:t>
             </a:r>
+            <a:endParaRPr lang="en-US"/>
           </a:p>
         </p:txBody>
       </p:sp>
@@ -1372,6 +1358,7 @@
               <a:rPr lang="en-US"/>
               <a:t>Click to edit Master text styles</a:t>
             </a:r>
+            <a:endParaRPr lang="en-US"/>
           </a:p>
         </p:txBody>
       </p:sp>
@@ -1392,7 +1379,6 @@
           <a:p>
             <a:fld id="{5BCAD085-E8A6-8845-BD4E-CB4CCA059FC4}" type="datetimeFigureOut">
               <a:rPr lang="en-US" smtClean="0"/>
-              <a:t>9/24/2025</a:t>
             </a:fld>
             <a:endParaRPr lang="en-US"/>
           </a:p>
@@ -1434,7 +1420,6 @@
           <a:p>
             <a:fld id="{C1FF6DA9-008F-8B48-92A6-B652298478BF}" type="slidenum">
               <a:rPr lang="en-US" smtClean="0"/>
-              <a:t>‹#›</a:t>
             </a:fld>
             <a:endParaRPr lang="en-US"/>
           </a:p>
@@ -1471,6 +1456,12 @@
               </a:rPr>
               <a:t>“</a:t>
             </a:r>
+            <a:endParaRPr lang="en-US" sz="7200" dirty="0">
+              <a:solidFill>
+                <a:schemeClr val="tx1"/>
+              </a:solidFill>
+              <a:effectLst/>
+            </a:endParaRPr>
           </a:p>
         </p:txBody>
       </p:sp>
@@ -1505,6 +1496,12 @@
               </a:rPr>
               <a:t>”</a:t>
             </a:r>
+            <a:endParaRPr lang="en-US" sz="7200" dirty="0">
+              <a:solidFill>
+                <a:schemeClr val="tx1"/>
+              </a:solidFill>
+              <a:effectLst/>
+            </a:endParaRPr>
           </a:p>
         </p:txBody>
       </p:sp>
@@ -1540,11 +1537,6 @@
         </p:style>
       </p:cxnSp>
     </p:spTree>
-    <p:extLst>
-      <p:ext uri="{BB962C8B-B14F-4D97-AF65-F5344CB8AC3E}">
-        <p14:creationId xmlns:p14="http://schemas.microsoft.com/office/powerpoint/2010/main" val="2976119344"/>
-      </p:ext>
-    </p:extLst>
   </p:cSld>
   <p:clrMapOvr>
     <a:masterClrMapping/>
@@ -1719,6 +1711,7 @@
               <a:rPr lang="en-US"/>
               <a:t>Click to edit Master text styles</a:t>
             </a:r>
+            <a:endParaRPr lang="en-US"/>
           </a:p>
         </p:txBody>
       </p:sp>
@@ -1739,7 +1732,6 @@
           <a:p>
             <a:fld id="{5BCAD085-E8A6-8845-BD4E-CB4CCA059FC4}" type="datetimeFigureOut">
               <a:rPr lang="en-US" smtClean="0"/>
-              <a:t>9/24/2025</a:t>
             </a:fld>
             <a:endParaRPr lang="en-US"/>
           </a:p>
@@ -1781,18 +1773,12 @@
           <a:p>
             <a:fld id="{C1FF6DA9-008F-8B48-92A6-B652298478BF}" type="slidenum">
               <a:rPr lang="en-US" smtClean="0"/>
-              <a:t>‹#›</a:t>
             </a:fld>
             <a:endParaRPr lang="en-US"/>
           </a:p>
         </p:txBody>
       </p:sp>
     </p:spTree>
-    <p:extLst>
-      <p:ext uri="{BB962C8B-B14F-4D97-AF65-F5344CB8AC3E}">
-        <p14:creationId xmlns:p14="http://schemas.microsoft.com/office/powerpoint/2010/main" val="1159160906"/>
-      </p:ext>
-    </p:extLst>
   </p:cSld>
   <p:clrMapOvr>
     <a:masterClrMapping/>
@@ -1974,6 +1960,7 @@
               <a:rPr lang="en-US"/>
               <a:t>Click to edit Master text styles</a:t>
             </a:r>
+            <a:endParaRPr lang="en-US"/>
           </a:p>
         </p:txBody>
       </p:sp>
@@ -2093,6 +2080,7 @@
               <a:rPr lang="en-US"/>
               <a:t>Click to edit Master text styles</a:t>
             </a:r>
+            <a:endParaRPr lang="en-US"/>
           </a:p>
         </p:txBody>
       </p:sp>
@@ -2113,7 +2101,6 @@
           <a:p>
             <a:fld id="{5BCAD085-E8A6-8845-BD4E-CB4CCA059FC4}" type="datetimeFigureOut">
               <a:rPr lang="en-US" smtClean="0"/>
-              <a:t>9/24/2025</a:t>
             </a:fld>
             <a:endParaRPr lang="en-US"/>
           </a:p>
@@ -2155,7 +2142,6 @@
           <a:p>
             <a:fld id="{C1FF6DA9-008F-8B48-92A6-B652298478BF}" type="slidenum">
               <a:rPr lang="en-US" smtClean="0"/>
-              <a:t>‹#›</a:t>
             </a:fld>
             <a:endParaRPr lang="en-US"/>
           </a:p>
@@ -2192,6 +2178,12 @@
               </a:rPr>
               <a:t>“</a:t>
             </a:r>
+            <a:endParaRPr lang="en-US" sz="8000" dirty="0">
+              <a:solidFill>
+                <a:schemeClr val="tx1"/>
+              </a:solidFill>
+              <a:effectLst/>
+            </a:endParaRPr>
           </a:p>
         </p:txBody>
       </p:sp>
@@ -2226,6 +2218,12 @@
               </a:rPr>
               <a:t>”</a:t>
             </a:r>
+            <a:endParaRPr lang="en-US" sz="8000" dirty="0">
+              <a:solidFill>
+                <a:schemeClr val="tx1"/>
+              </a:solidFill>
+              <a:effectLst/>
+            </a:endParaRPr>
           </a:p>
         </p:txBody>
       </p:sp>
@@ -2261,11 +2259,6 @@
         </p:style>
       </p:cxnSp>
     </p:spTree>
-    <p:extLst>
-      <p:ext uri="{BB962C8B-B14F-4D97-AF65-F5344CB8AC3E}">
-        <p14:creationId xmlns:p14="http://schemas.microsoft.com/office/powerpoint/2010/main" val="964248495"/>
-      </p:ext>
-    </p:extLst>
   </p:cSld>
   <p:clrMapOvr>
     <a:masterClrMapping/>
@@ -2444,6 +2437,7 @@
               <a:rPr lang="en-US"/>
               <a:t>Click to edit Master text styles</a:t>
             </a:r>
+            <a:endParaRPr lang="en-US"/>
           </a:p>
         </p:txBody>
       </p:sp>
@@ -2563,6 +2557,7 @@
               <a:rPr lang="en-US"/>
               <a:t>Click to edit Master text styles</a:t>
             </a:r>
+            <a:endParaRPr lang="en-US"/>
           </a:p>
         </p:txBody>
       </p:sp>
@@ -2583,7 +2578,6 @@
           <a:p>
             <a:fld id="{5BCAD085-E8A6-8845-BD4E-CB4CCA059FC4}" type="datetimeFigureOut">
               <a:rPr lang="en-US" smtClean="0"/>
-              <a:t>9/24/2025</a:t>
             </a:fld>
             <a:endParaRPr lang="en-US"/>
           </a:p>
@@ -2625,7 +2619,6 @@
           <a:p>
             <a:fld id="{C1FF6DA9-008F-8B48-92A6-B652298478BF}" type="slidenum">
               <a:rPr lang="en-US" smtClean="0"/>
-              <a:t>‹#›</a:t>
             </a:fld>
             <a:endParaRPr lang="en-US"/>
           </a:p>
@@ -2663,11 +2656,6 @@
         </p:style>
       </p:cxnSp>
     </p:spTree>
-    <p:extLst>
-      <p:ext uri="{BB962C8B-B14F-4D97-AF65-F5344CB8AC3E}">
-        <p14:creationId xmlns:p14="http://schemas.microsoft.com/office/powerpoint/2010/main" val="3741479373"/>
-      </p:ext>
-    </p:extLst>
   </p:cSld>
   <p:clrMapOvr>
     <a:masterClrMapping/>
@@ -2744,6 +2732,7 @@
               <a:rPr lang="en-US"/>
               <a:t>Click to edit Master text styles</a:t>
             </a:r>
+            <a:endParaRPr lang="en-US"/>
           </a:p>
           <a:p>
             <a:pPr lvl="1"/>
@@ -2751,6 +2740,7 @@
               <a:rPr lang="en-US"/>
               <a:t>Second level</a:t>
             </a:r>
+            <a:endParaRPr lang="en-US"/>
           </a:p>
           <a:p>
             <a:pPr lvl="2"/>
@@ -2758,6 +2748,7 @@
               <a:rPr lang="en-US"/>
               <a:t>Third level</a:t>
             </a:r>
+            <a:endParaRPr lang="en-US"/>
           </a:p>
           <a:p>
             <a:pPr lvl="3"/>
@@ -2765,6 +2756,7 @@
               <a:rPr lang="en-US"/>
               <a:t>Fourth level</a:t>
             </a:r>
+            <a:endParaRPr lang="en-US"/>
           </a:p>
           <a:p>
             <a:pPr lvl="4"/>
@@ -2793,7 +2785,6 @@
           <a:p>
             <a:fld id="{5BCAD085-E8A6-8845-BD4E-CB4CCA059FC4}" type="datetimeFigureOut">
               <a:rPr lang="en-US" smtClean="0"/>
-              <a:t>9/24/2025</a:t>
             </a:fld>
             <a:endParaRPr lang="en-US"/>
           </a:p>
@@ -2835,7 +2826,6 @@
           <a:p>
             <a:fld id="{C1FF6DA9-008F-8B48-92A6-B652298478BF}" type="slidenum">
               <a:rPr lang="en-US" smtClean="0"/>
-              <a:t>‹#›</a:t>
             </a:fld>
             <a:endParaRPr lang="en-US"/>
           </a:p>
@@ -2873,11 +2863,6 @@
         </p:style>
       </p:cxnSp>
     </p:spTree>
-    <p:extLst>
-      <p:ext uri="{BB962C8B-B14F-4D97-AF65-F5344CB8AC3E}">
-        <p14:creationId xmlns:p14="http://schemas.microsoft.com/office/powerpoint/2010/main" val="2423406571"/>
-      </p:ext>
-    </p:extLst>
   </p:cSld>
   <p:clrMapOvr>
     <a:masterClrMapping/>
@@ -2955,6 +2940,7 @@
               <a:rPr lang="en-US"/>
               <a:t>Click to edit Master text styles</a:t>
             </a:r>
+            <a:endParaRPr lang="en-US"/>
           </a:p>
           <a:p>
             <a:pPr lvl="1"/>
@@ -2962,6 +2948,7 @@
               <a:rPr lang="en-US"/>
               <a:t>Second level</a:t>
             </a:r>
+            <a:endParaRPr lang="en-US"/>
           </a:p>
           <a:p>
             <a:pPr lvl="2"/>
@@ -2969,6 +2956,7 @@
               <a:rPr lang="en-US"/>
               <a:t>Third level</a:t>
             </a:r>
+            <a:endParaRPr lang="en-US"/>
           </a:p>
           <a:p>
             <a:pPr lvl="3"/>
@@ -2976,6 +2964,7 @@
               <a:rPr lang="en-US"/>
               <a:t>Fourth level</a:t>
             </a:r>
+            <a:endParaRPr lang="en-US"/>
           </a:p>
           <a:p>
             <a:pPr lvl="4"/>
@@ -3004,7 +2993,6 @@
           <a:p>
             <a:fld id="{5BCAD085-E8A6-8845-BD4E-CB4CCA059FC4}" type="datetimeFigureOut">
               <a:rPr lang="en-US" smtClean="0"/>
-              <a:t>9/24/2025</a:t>
             </a:fld>
             <a:endParaRPr lang="en-US"/>
           </a:p>
@@ -3046,7 +3034,6 @@
           <a:p>
             <a:fld id="{C1FF6DA9-008F-8B48-92A6-B652298478BF}" type="slidenum">
               <a:rPr lang="en-US" smtClean="0"/>
-              <a:t>‹#›</a:t>
             </a:fld>
             <a:endParaRPr lang="en-US"/>
           </a:p>
@@ -3084,11 +3071,6 @@
         </p:style>
       </p:cxnSp>
     </p:spTree>
-    <p:extLst>
-      <p:ext uri="{BB962C8B-B14F-4D97-AF65-F5344CB8AC3E}">
-        <p14:creationId xmlns:p14="http://schemas.microsoft.com/office/powerpoint/2010/main" val="4189845734"/>
-      </p:ext>
-    </p:extLst>
   </p:cSld>
   <p:clrMapOvr>
     <a:masterClrMapping/>
@@ -3187,6 +3169,7 @@
               <a:rPr lang="en-US"/>
               <a:t>Click to edit Master text styles</a:t>
             </a:r>
+            <a:endParaRPr lang="en-US"/>
           </a:p>
           <a:p>
             <a:pPr lvl="1"/>
@@ -3194,6 +3177,7 @@
               <a:rPr lang="en-US"/>
               <a:t>Second level</a:t>
             </a:r>
+            <a:endParaRPr lang="en-US"/>
           </a:p>
           <a:p>
             <a:pPr lvl="2"/>
@@ -3201,6 +3185,7 @@
               <a:rPr lang="en-US"/>
               <a:t>Third level</a:t>
             </a:r>
+            <a:endParaRPr lang="en-US"/>
           </a:p>
           <a:p>
             <a:pPr lvl="3"/>
@@ -3208,6 +3193,7 @@
               <a:rPr lang="en-US"/>
               <a:t>Fourth level</a:t>
             </a:r>
+            <a:endParaRPr lang="en-US"/>
           </a:p>
           <a:p>
             <a:pPr lvl="4"/>
@@ -3236,7 +3222,6 @@
           <a:p>
             <a:fld id="{5BCAD085-E8A6-8845-BD4E-CB4CCA059FC4}" type="datetimeFigureOut">
               <a:rPr lang="en-US" smtClean="0"/>
-              <a:t>9/24/2025</a:t>
             </a:fld>
             <a:endParaRPr lang="en-US"/>
           </a:p>
@@ -3278,18 +3263,12 @@
           <a:p>
             <a:fld id="{C1FF6DA9-008F-8B48-92A6-B652298478BF}" type="slidenum">
               <a:rPr lang="en-US" smtClean="0"/>
-              <a:t>‹#›</a:t>
             </a:fld>
             <a:endParaRPr lang="en-US"/>
           </a:p>
         </p:txBody>
       </p:sp>
     </p:spTree>
-    <p:extLst>
-      <p:ext uri="{BB962C8B-B14F-4D97-AF65-F5344CB8AC3E}">
-        <p14:creationId xmlns:p14="http://schemas.microsoft.com/office/powerpoint/2010/main" val="3880249083"/>
-      </p:ext>
-    </p:extLst>
   </p:cSld>
   <p:clrMapOvr>
     <a:masterClrMapping/>
@@ -3464,6 +3443,7 @@
               <a:rPr lang="en-US"/>
               <a:t>Click to edit Master text styles</a:t>
             </a:r>
+            <a:endParaRPr lang="en-US"/>
           </a:p>
         </p:txBody>
       </p:sp>
@@ -3484,7 +3464,6 @@
           <a:p>
             <a:fld id="{5BCAD085-E8A6-8845-BD4E-CB4CCA059FC4}" type="datetimeFigureOut">
               <a:rPr lang="en-US" smtClean="0"/>
-              <a:t>9/24/2025</a:t>
             </a:fld>
             <a:endParaRPr lang="en-US"/>
           </a:p>
@@ -3526,7 +3505,6 @@
           <a:p>
             <a:fld id="{C1FF6DA9-008F-8B48-92A6-B652298478BF}" type="slidenum">
               <a:rPr lang="en-US" smtClean="0"/>
-              <a:t>‹#›</a:t>
             </a:fld>
             <a:endParaRPr lang="en-US"/>
           </a:p>
@@ -3564,11 +3542,6 @@
         </p:style>
       </p:cxnSp>
     </p:spTree>
-    <p:extLst>
-      <p:ext uri="{BB962C8B-B14F-4D97-AF65-F5344CB8AC3E}">
-        <p14:creationId xmlns:p14="http://schemas.microsoft.com/office/powerpoint/2010/main" val="1811209573"/>
-      </p:ext>
-    </p:extLst>
   </p:cSld>
   <p:clrMapOvr>
     <a:masterClrMapping/>
@@ -3679,6 +3652,7 @@
               <a:rPr lang="en-US"/>
               <a:t>Click to edit Master text styles</a:t>
             </a:r>
+            <a:endParaRPr lang="en-US"/>
           </a:p>
           <a:p>
             <a:pPr lvl="1"/>
@@ -3686,6 +3660,7 @@
               <a:rPr lang="en-US"/>
               <a:t>Second level</a:t>
             </a:r>
+            <a:endParaRPr lang="en-US"/>
           </a:p>
           <a:p>
             <a:pPr lvl="2"/>
@@ -3693,6 +3668,7 @@
               <a:rPr lang="en-US"/>
               <a:t>Third level</a:t>
             </a:r>
+            <a:endParaRPr lang="en-US"/>
           </a:p>
           <a:p>
             <a:pPr lvl="3"/>
@@ -3700,6 +3676,7 @@
               <a:rPr lang="en-US"/>
               <a:t>Fourth level</a:t>
             </a:r>
+            <a:endParaRPr lang="en-US"/>
           </a:p>
           <a:p>
             <a:pPr lvl="4"/>
@@ -3738,6 +3715,7 @@
               <a:rPr lang="en-US"/>
               <a:t>Click to edit Master text styles</a:t>
             </a:r>
+            <a:endParaRPr lang="en-US"/>
           </a:p>
           <a:p>
             <a:pPr lvl="1"/>
@@ -3745,6 +3723,7 @@
               <a:rPr lang="en-US"/>
               <a:t>Second level</a:t>
             </a:r>
+            <a:endParaRPr lang="en-US"/>
           </a:p>
           <a:p>
             <a:pPr lvl="2"/>
@@ -3752,6 +3731,7 @@
               <a:rPr lang="en-US"/>
               <a:t>Third level</a:t>
             </a:r>
+            <a:endParaRPr lang="en-US"/>
           </a:p>
           <a:p>
             <a:pPr lvl="3"/>
@@ -3759,6 +3739,7 @@
               <a:rPr lang="en-US"/>
               <a:t>Fourth level</a:t>
             </a:r>
+            <a:endParaRPr lang="en-US"/>
           </a:p>
           <a:p>
             <a:pPr lvl="4"/>
@@ -3787,7 +3768,6 @@
           <a:p>
             <a:fld id="{5BCAD085-E8A6-8845-BD4E-CB4CCA059FC4}" type="datetimeFigureOut">
               <a:rPr lang="en-US" smtClean="0"/>
-              <a:t>9/24/2025</a:t>
             </a:fld>
             <a:endParaRPr lang="en-US"/>
           </a:p>
@@ -3829,18 +3809,12 @@
           <a:p>
             <a:fld id="{C1FF6DA9-008F-8B48-92A6-B652298478BF}" type="slidenum">
               <a:rPr lang="en-US" smtClean="0"/>
-              <a:t>‹#›</a:t>
             </a:fld>
             <a:endParaRPr lang="en-US"/>
           </a:p>
         </p:txBody>
       </p:sp>
     </p:spTree>
-    <p:extLst>
-      <p:ext uri="{BB962C8B-B14F-4D97-AF65-F5344CB8AC3E}">
-        <p14:creationId xmlns:p14="http://schemas.microsoft.com/office/powerpoint/2010/main" val="193272298"/>
-      </p:ext>
-    </p:extLst>
   </p:cSld>
   <p:clrMapOvr>
     <a:masterClrMapping/>
@@ -3960,6 +3934,7 @@
               <a:rPr lang="en-US"/>
               <a:t>Click to edit Master text styles</a:t>
             </a:r>
+            <a:endParaRPr lang="en-US"/>
           </a:p>
         </p:txBody>
       </p:sp>
@@ -3990,6 +3965,7 @@
               <a:rPr lang="en-US"/>
               <a:t>Click to edit Master text styles</a:t>
             </a:r>
+            <a:endParaRPr lang="en-US"/>
           </a:p>
           <a:p>
             <a:pPr lvl="1"/>
@@ -3997,6 +3973,7 @@
               <a:rPr lang="en-US"/>
               <a:t>Second level</a:t>
             </a:r>
+            <a:endParaRPr lang="en-US"/>
           </a:p>
           <a:p>
             <a:pPr lvl="2"/>
@@ -4004,6 +3981,7 @@
               <a:rPr lang="en-US"/>
               <a:t>Third level</a:t>
             </a:r>
+            <a:endParaRPr lang="en-US"/>
           </a:p>
           <a:p>
             <a:pPr lvl="3"/>
@@ -4011,6 +3989,7 @@
               <a:rPr lang="en-US"/>
               <a:t>Fourth level</a:t>
             </a:r>
+            <a:endParaRPr lang="en-US"/>
           </a:p>
           <a:p>
             <a:pPr lvl="4"/>
@@ -4090,6 +4069,7 @@
               <a:rPr lang="en-US"/>
               <a:t>Click to edit Master text styles</a:t>
             </a:r>
+            <a:endParaRPr lang="en-US"/>
           </a:p>
         </p:txBody>
       </p:sp>
@@ -4120,6 +4100,7 @@
               <a:rPr lang="en-US"/>
               <a:t>Click to edit Master text styles</a:t>
             </a:r>
+            <a:endParaRPr lang="en-US"/>
           </a:p>
           <a:p>
             <a:pPr lvl="1"/>
@@ -4127,6 +4108,7 @@
               <a:rPr lang="en-US"/>
               <a:t>Second level</a:t>
             </a:r>
+            <a:endParaRPr lang="en-US"/>
           </a:p>
           <a:p>
             <a:pPr lvl="2"/>
@@ -4134,6 +4116,7 @@
               <a:rPr lang="en-US"/>
               <a:t>Third level</a:t>
             </a:r>
+            <a:endParaRPr lang="en-US"/>
           </a:p>
           <a:p>
             <a:pPr lvl="3"/>
@@ -4141,6 +4124,7 @@
               <a:rPr lang="en-US"/>
               <a:t>Fourth level</a:t>
             </a:r>
+            <a:endParaRPr lang="en-US"/>
           </a:p>
           <a:p>
             <a:pPr lvl="4"/>
@@ -4169,7 +4153,6 @@
           <a:p>
             <a:fld id="{5BCAD085-E8A6-8845-BD4E-CB4CCA059FC4}" type="datetimeFigureOut">
               <a:rPr lang="en-US" smtClean="0"/>
-              <a:t>9/24/2025</a:t>
             </a:fld>
             <a:endParaRPr lang="en-US"/>
           </a:p>
@@ -4211,7 +4194,6 @@
           <a:p>
             <a:fld id="{C1FF6DA9-008F-8B48-92A6-B652298478BF}" type="slidenum">
               <a:rPr lang="en-US" smtClean="0"/>
-              <a:t>‹#›</a:t>
             </a:fld>
             <a:endParaRPr lang="en-US"/>
           </a:p>
@@ -4249,11 +4231,6 @@
         </p:style>
       </p:cxnSp>
     </p:spTree>
-    <p:extLst>
-      <p:ext uri="{BB962C8B-B14F-4D97-AF65-F5344CB8AC3E}">
-        <p14:creationId xmlns:p14="http://schemas.microsoft.com/office/powerpoint/2010/main" val="2649457424"/>
-      </p:ext>
-    </p:extLst>
   </p:cSld>
   <p:clrMapOvr>
     <a:masterClrMapping/>
@@ -4323,7 +4300,6 @@
           <a:p>
             <a:fld id="{5BCAD085-E8A6-8845-BD4E-CB4CCA059FC4}" type="datetimeFigureOut">
               <a:rPr lang="en-US" smtClean="0"/>
-              <a:t>9/24/2025</a:t>
             </a:fld>
             <a:endParaRPr lang="en-US"/>
           </a:p>
@@ -4365,7 +4341,6 @@
           <a:p>
             <a:fld id="{C1FF6DA9-008F-8B48-92A6-B652298478BF}" type="slidenum">
               <a:rPr lang="en-US" smtClean="0"/>
-              <a:t>‹#›</a:t>
             </a:fld>
             <a:endParaRPr lang="en-US"/>
           </a:p>
@@ -4403,11 +4378,6 @@
         </p:style>
       </p:cxnSp>
     </p:spTree>
-    <p:extLst>
-      <p:ext uri="{BB962C8B-B14F-4D97-AF65-F5344CB8AC3E}">
-        <p14:creationId xmlns:p14="http://schemas.microsoft.com/office/powerpoint/2010/main" val="3733287083"/>
-      </p:ext>
-    </p:extLst>
   </p:cSld>
   <p:clrMapOvr>
     <a:masterClrMapping/>
@@ -4449,7 +4419,6 @@
           <a:p>
             <a:fld id="{5BCAD085-E8A6-8845-BD4E-CB4CCA059FC4}" type="datetimeFigureOut">
               <a:rPr lang="en-US" smtClean="0"/>
-              <a:t>9/24/2025</a:t>
             </a:fld>
             <a:endParaRPr lang="en-US"/>
           </a:p>
@@ -4491,18 +4460,12 @@
           <a:p>
             <a:fld id="{C1FF6DA9-008F-8B48-92A6-B652298478BF}" type="slidenum">
               <a:rPr lang="en-US" smtClean="0"/>
-              <a:t>‹#›</a:t>
             </a:fld>
             <a:endParaRPr lang="en-US"/>
           </a:p>
         </p:txBody>
       </p:sp>
     </p:spTree>
-    <p:extLst>
-      <p:ext uri="{BB962C8B-B14F-4D97-AF65-F5344CB8AC3E}">
-        <p14:creationId xmlns:p14="http://schemas.microsoft.com/office/powerpoint/2010/main" val="4098024416"/>
-      </p:ext>
-    </p:extLst>
   </p:cSld>
   <p:clrMapOvr>
     <a:masterClrMapping/>
@@ -4588,6 +4551,7 @@
               <a:rPr lang="en-US"/>
               <a:t>Click to edit Master text styles</a:t>
             </a:r>
+            <a:endParaRPr lang="en-US"/>
           </a:p>
           <a:p>
             <a:pPr lvl="1"/>
@@ -4595,6 +4559,7 @@
               <a:rPr lang="en-US"/>
               <a:t>Second level</a:t>
             </a:r>
+            <a:endParaRPr lang="en-US"/>
           </a:p>
           <a:p>
             <a:pPr lvl="2"/>
@@ -4602,6 +4567,7 @@
               <a:rPr lang="en-US"/>
               <a:t>Third level</a:t>
             </a:r>
+            <a:endParaRPr lang="en-US"/>
           </a:p>
           <a:p>
             <a:pPr lvl="3"/>
@@ -4609,6 +4575,7 @@
               <a:rPr lang="en-US"/>
               <a:t>Fourth level</a:t>
             </a:r>
+            <a:endParaRPr lang="en-US"/>
           </a:p>
           <a:p>
             <a:pPr lvl="4"/>
@@ -4684,6 +4651,7 @@
               <a:rPr lang="en-US"/>
               <a:t>Click to edit Master text styles</a:t>
             </a:r>
+            <a:endParaRPr lang="en-US"/>
           </a:p>
         </p:txBody>
       </p:sp>
@@ -4704,7 +4672,6 @@
           <a:p>
             <a:fld id="{5BCAD085-E8A6-8845-BD4E-CB4CCA059FC4}" type="datetimeFigureOut">
               <a:rPr lang="en-US" smtClean="0"/>
-              <a:t>9/24/2025</a:t>
             </a:fld>
             <a:endParaRPr lang="en-US"/>
           </a:p>
@@ -4746,7 +4713,6 @@
           <a:p>
             <a:fld id="{C1FF6DA9-008F-8B48-92A6-B652298478BF}" type="slidenum">
               <a:rPr lang="en-US" smtClean="0"/>
-              <a:t>‹#›</a:t>
             </a:fld>
             <a:endParaRPr lang="en-US"/>
           </a:p>
@@ -4784,11 +4750,6 @@
         </p:style>
       </p:cxnSp>
     </p:spTree>
-    <p:extLst>
-      <p:ext uri="{BB962C8B-B14F-4D97-AF65-F5344CB8AC3E}">
-        <p14:creationId xmlns:p14="http://schemas.microsoft.com/office/powerpoint/2010/main" val="889011711"/>
-      </p:ext>
-    </p:extLst>
   </p:cSld>
   <p:clrMapOvr>
     <a:masterClrMapping/>
@@ -4998,6 +4959,7 @@
               <a:rPr lang="en-US"/>
               <a:t>Click to edit Master text styles</a:t>
             </a:r>
+            <a:endParaRPr lang="en-US"/>
           </a:p>
         </p:txBody>
       </p:sp>
@@ -5018,7 +4980,6 @@
           <a:p>
             <a:fld id="{5BCAD085-E8A6-8845-BD4E-CB4CCA059FC4}" type="datetimeFigureOut">
               <a:rPr lang="en-US" smtClean="0"/>
-              <a:t>9/24/2025</a:t>
             </a:fld>
             <a:endParaRPr lang="en-US"/>
           </a:p>
@@ -5060,18 +5021,12 @@
           <a:p>
             <a:fld id="{C1FF6DA9-008F-8B48-92A6-B652298478BF}" type="slidenum">
               <a:rPr lang="en-US" smtClean="0"/>
-              <a:t>‹#›</a:t>
             </a:fld>
             <a:endParaRPr lang="en-US"/>
           </a:p>
         </p:txBody>
       </p:sp>
     </p:spTree>
-    <p:extLst>
-      <p:ext uri="{BB962C8B-B14F-4D97-AF65-F5344CB8AC3E}">
-        <p14:creationId xmlns:p14="http://schemas.microsoft.com/office/powerpoint/2010/main" val="3933887447"/>
-      </p:ext>
-    </p:extLst>
   </p:cSld>
   <p:clrMapOvr>
     <a:masterClrMapping/>
@@ -5124,7 +5079,7 @@
             <p:nvPr/>
           </p:nvPicPr>
           <p:blipFill>
-            <a:blip r:embed="rId19">
+            <a:blip r:embed="rId18">
               <a:extLst>
                 <a:ext uri="{28A0092B-C50C-407E-A947-70E740481C1C}">
                   <a14:useLocalDpi xmlns:a14="http://schemas.microsoft.com/office/drawing/2010/main" val="0"/>
@@ -5188,7 +5143,7 @@
             <p:nvPr/>
           </p:nvPicPr>
           <p:blipFill rotWithShape="1">
-            <a:blip r:embed="rId20">
+            <a:blip r:embed="rId19">
               <a:extLst>
                 <a:ext uri="{28A0092B-C50C-407E-A947-70E740481C1C}">
                   <a14:useLocalDpi xmlns:a14="http://schemas.microsoft.com/office/drawing/2010/main" val="0"/>
@@ -5196,7 +5151,9 @@
               </a:extLst>
             </a:blip>
             <a:srcRect l="1" r="14240"/>
-            <a:stretch/>
+            <a:stretch>
+              <a:fillRect/>
+            </a:stretch>
           </p:blipFill>
           <p:spPr>
             <a:xfrm>
@@ -5217,7 +5174,7 @@
             <p:nvPr/>
           </p:nvPicPr>
           <p:blipFill rotWithShape="1">
-            <a:blip r:embed="rId20">
+            <a:blip r:embed="rId19">
               <a:extLst>
                 <a:ext uri="{28A0092B-C50C-407E-A947-70E740481C1C}">
                   <a14:useLocalDpi xmlns:a14="http://schemas.microsoft.com/office/drawing/2010/main" val="0"/>
@@ -5225,7 +5182,9 @@
               </a:extLst>
             </a:blip>
             <a:srcRect l="1" r="14240"/>
-            <a:stretch/>
+            <a:stretch>
+              <a:fillRect/>
+            </a:stretch>
           </p:blipFill>
           <p:spPr>
             <a:xfrm>
@@ -5302,6 +5261,7 @@
               <a:rPr lang="en-US"/>
               <a:t>Click to edit Master text styles</a:t>
             </a:r>
+            <a:endParaRPr lang="en-US"/>
           </a:p>
           <a:p>
             <a:pPr lvl="1"/>
@@ -5309,6 +5269,7 @@
               <a:rPr lang="en-US"/>
               <a:t>Second level</a:t>
             </a:r>
+            <a:endParaRPr lang="en-US"/>
           </a:p>
           <a:p>
             <a:pPr lvl="2"/>
@@ -5316,6 +5277,7 @@
               <a:rPr lang="en-US"/>
               <a:t>Third level</a:t>
             </a:r>
+            <a:endParaRPr lang="en-US"/>
           </a:p>
           <a:p>
             <a:pPr lvl="3"/>
@@ -5323,6 +5285,7 @@
               <a:rPr lang="en-US"/>
               <a:t>Fourth level</a:t>
             </a:r>
+            <a:endParaRPr lang="en-US"/>
           </a:p>
           <a:p>
             <a:pPr lvl="4"/>
@@ -5369,7 +5332,6 @@
           <a:p>
             <a:fld id="{5BCAD085-E8A6-8845-BD4E-CB4CCA059FC4}" type="datetimeFigureOut">
               <a:rPr lang="en-US" smtClean="0"/>
-              <a:t>9/24/2025</a:t>
             </a:fld>
             <a:endParaRPr lang="en-US"/>
           </a:p>
@@ -5447,38 +5409,32 @@
           <a:p>
             <a:fld id="{C1FF6DA9-008F-8B48-92A6-B652298478BF}" type="slidenum">
               <a:rPr lang="en-US" smtClean="0"/>
-              <a:t>‹#›</a:t>
             </a:fld>
             <a:endParaRPr lang="en-US"/>
           </a:p>
         </p:txBody>
       </p:sp>
     </p:spTree>
-    <p:extLst>
-      <p:ext uri="{BB962C8B-B14F-4D97-AF65-F5344CB8AC3E}">
-        <p14:creationId xmlns:p14="http://schemas.microsoft.com/office/powerpoint/2010/main" val="3327238098"/>
-      </p:ext>
-    </p:extLst>
   </p:cSld>
   <p:clrMap bg1="lt1" tx1="dk1" bg2="lt2" tx2="dk2" accent1="accent1" accent2="accent2" accent3="accent3" accent4="accent4" accent5="accent5" accent6="accent6" hlink="hlink" folHlink="folHlink"/>
   <p:sldLayoutIdLst>
-    <p:sldLayoutId id="2147483733" r:id="rId1"/>
-    <p:sldLayoutId id="2147483734" r:id="rId2"/>
-    <p:sldLayoutId id="2147483735" r:id="rId3"/>
-    <p:sldLayoutId id="2147483736" r:id="rId4"/>
-    <p:sldLayoutId id="2147483737" r:id="rId5"/>
-    <p:sldLayoutId id="2147483738" r:id="rId6"/>
-    <p:sldLayoutId id="2147483739" r:id="rId7"/>
-    <p:sldLayoutId id="2147483740" r:id="rId8"/>
-    <p:sldLayoutId id="2147483741" r:id="rId9"/>
-    <p:sldLayoutId id="2147483742" r:id="rId10"/>
-    <p:sldLayoutId id="2147483743" r:id="rId11"/>
-    <p:sldLayoutId id="2147483744" r:id="rId12"/>
-    <p:sldLayoutId id="2147483745" r:id="rId13"/>
-    <p:sldLayoutId id="2147483746" r:id="rId14"/>
-    <p:sldLayoutId id="2147483747" r:id="rId15"/>
-    <p:sldLayoutId id="2147483748" r:id="rId16"/>
-    <p:sldLayoutId id="2147483749" r:id="rId17"/>
+    <p:sldLayoutId id="2147483649" r:id="rId1"/>
+    <p:sldLayoutId id="2147483650" r:id="rId2"/>
+    <p:sldLayoutId id="2147483651" r:id="rId3"/>
+    <p:sldLayoutId id="2147483652" r:id="rId4"/>
+    <p:sldLayoutId id="2147483653" r:id="rId5"/>
+    <p:sldLayoutId id="2147483654" r:id="rId6"/>
+    <p:sldLayoutId id="2147483655" r:id="rId7"/>
+    <p:sldLayoutId id="2147483656" r:id="rId8"/>
+    <p:sldLayoutId id="2147483657" r:id="rId9"/>
+    <p:sldLayoutId id="2147483658" r:id="rId10"/>
+    <p:sldLayoutId id="2147483659" r:id="rId11"/>
+    <p:sldLayoutId id="2147483660" r:id="rId12"/>
+    <p:sldLayoutId id="2147483661" r:id="rId13"/>
+    <p:sldLayoutId id="2147483662" r:id="rId14"/>
+    <p:sldLayoutId id="2147483663" r:id="rId15"/>
+    <p:sldLayoutId id="2147483664" r:id="rId16"/>
+    <p:sldLayoutId id="2147483665" r:id="rId17"/>
   </p:sldLayoutIdLst>
   <p:txStyles>
     <p:titleStyle>
@@ -5572,7 +5528,7 @@
           <a:schemeClr val="accent1"/>
         </a:buClr>
         <a:buSzPct val="115000"/>
-        <a:buFont typeface="Arial"/>
+        <a:buFont typeface="Arial" panose="020B0604020202020204"/>
         <a:buChar char="•"/>
         <a:defRPr sz="2400" kern="1200" cap="none">
           <a:solidFill>
@@ -5598,7 +5554,7 @@
           <a:schemeClr val="accent1"/>
         </a:buClr>
         <a:buSzPct val="115000"/>
-        <a:buFont typeface="Arial"/>
+        <a:buFont typeface="Arial" panose="020B0604020202020204"/>
         <a:buChar char="•"/>
         <a:defRPr sz="2000" kern="1200" cap="none">
           <a:solidFill>
@@ -5624,7 +5580,7 @@
           <a:schemeClr val="accent1"/>
         </a:buClr>
         <a:buSzPct val="115000"/>
-        <a:buFont typeface="Arial"/>
+        <a:buFont typeface="Arial" panose="020B0604020202020204"/>
         <a:buChar char="•"/>
         <a:defRPr sz="1800" kern="1200" cap="none">
           <a:solidFill>
@@ -5650,7 +5606,7 @@
           <a:schemeClr val="accent1"/>
         </a:buClr>
         <a:buSzPct val="115000"/>
-        <a:buFont typeface="Arial"/>
+        <a:buFont typeface="Arial" panose="020B0604020202020204"/>
         <a:buChar char="•"/>
         <a:defRPr sz="1600" kern="1200" cap="none">
           <a:solidFill>
@@ -5676,7 +5632,7 @@
           <a:schemeClr val="accent1"/>
         </a:buClr>
         <a:buSzPct val="115000"/>
-        <a:buFont typeface="Arial"/>
+        <a:buFont typeface="Arial" panose="020B0604020202020204"/>
         <a:buChar char="•"/>
         <a:defRPr sz="1400" kern="1200" cap="none">
           <a:solidFill>
@@ -5702,7 +5658,7 @@
           <a:schemeClr val="accent1"/>
         </a:buClr>
         <a:buSzPct val="115000"/>
-        <a:buFont typeface="Arial"/>
+        <a:buFont typeface="Arial" panose="020B0604020202020204"/>
         <a:buChar char="•"/>
         <a:defRPr sz="1400" kern="1200" cap="none">
           <a:solidFill>
@@ -5728,7 +5684,7 @@
           <a:schemeClr val="accent1"/>
         </a:buClr>
         <a:buSzPct val="115000"/>
-        <a:buFont typeface="Arial"/>
+        <a:buFont typeface="Arial" panose="020B0604020202020204"/>
         <a:buChar char="•"/>
         <a:defRPr sz="1400" kern="1200" cap="none">
           <a:solidFill>
@@ -5754,7 +5710,7 @@
           <a:schemeClr val="accent1"/>
         </a:buClr>
         <a:buSzPct val="115000"/>
-        <a:buFont typeface="Arial"/>
+        <a:buFont typeface="Arial" panose="020B0604020202020204"/>
         <a:buChar char="•"/>
         <a:defRPr sz="1400" kern="1200" cap="none">
           <a:solidFill>
@@ -5780,7 +5736,7 @@
           <a:schemeClr val="accent1"/>
         </a:buClr>
         <a:buSzPct val="115000"/>
-        <a:buFont typeface="Arial"/>
+        <a:buFont typeface="Arial" panose="020B0604020202020204"/>
         <a:buChar char="•"/>
         <a:defRPr sz="1400" kern="1200" cap="none">
           <a:solidFill>
@@ -5949,20 +5905,14 @@
           <a:lstStyle/>
           <a:p>
             <a:r>
-              <a:t>📊 Dataset Analysis &amp; Visualization using PySpark</a:t>
-            </a:r>
-          </a:p>
-        </p:txBody>
-      </p:sp>
-      <p:sp>
-        <p:nvSpPr>
-          <p:cNvPr id="4" name="TextBox 3">
-            <a:extLst>
-              <a:ext uri="{FF2B5EF4-FFF2-40B4-BE49-F238E27FC236}">
-                <a16:creationId xmlns:a16="http://schemas.microsoft.com/office/drawing/2014/main" id="{59C7201A-BE13-6AA1-AF26-1BDFD122DB7A}"/>
-              </a:ext>
-            </a:extLst>
-          </p:cNvPr>
+              <a:t> Dataset Analysis &amp; Visualization using PySpark</a:t>
+            </a:r>
+          </a:p>
+        </p:txBody>
+      </p:sp>
+      <p:sp>
+        <p:nvSpPr>
+          <p:cNvPr id="4" name="TextBox 3"/>
           <p:cNvSpPr txBox="1"/>
           <p:nvPr/>
         </p:nvSpPr>
@@ -5990,6 +5940,10 @@
               </a:rPr>
               <a:t>D. Sathvik</a:t>
             </a:r>
+            <a:endParaRPr lang="en-US" dirty="0">
+              <a:latin typeface="Times New Roman" panose="02020603050405020304" pitchFamily="18" charset="0"/>
+              <a:cs typeface="Times New Roman" panose="02020603050405020304" pitchFamily="18" charset="0"/>
+            </a:endParaRPr>
           </a:p>
           <a:p>
             <a:pPr algn="r"/>
@@ -6000,6 +5954,10 @@
               </a:rPr>
               <a:t>2211CS010141</a:t>
             </a:r>
+            <a:endParaRPr lang="en-US" dirty="0">
+              <a:latin typeface="Times New Roman" panose="02020603050405020304" pitchFamily="18" charset="0"/>
+              <a:cs typeface="Times New Roman" panose="02020603050405020304" pitchFamily="18" charset="0"/>
+            </a:endParaRPr>
           </a:p>
           <a:p>
             <a:pPr algn="r"/>
@@ -6071,6 +6029,10 @@
               </a:rPr>
               <a:t>Conclusion</a:t>
             </a:r>
+            <a:endParaRPr>
+              <a:latin typeface="Times New Roman" panose="02020603050405020304" pitchFamily="18" charset="0"/>
+              <a:cs typeface="Times New Roman" panose="02020603050405020304" pitchFamily="18" charset="0"/>
+            </a:endParaRPr>
           </a:p>
         </p:txBody>
       </p:sp>
@@ -6091,7 +6053,7 @@
           </a:bodyPr>
           <a:lstStyle/>
           <a:p>
-            <a:pPr marL="0" indent="0">
+            <a:pPr marL="0" indent="0" algn="just">
               <a:buNone/>
             </a:pPr>
             <a:r>
@@ -6101,9 +6063,13 @@
               </a:rPr>
               <a:t>- Dataset cleaned and processed successfully.</a:t>
             </a:r>
-          </a:p>
-          <a:p>
-            <a:pPr marL="0" indent="0">
+            <a:endParaRPr sz="2000" dirty="0">
+              <a:latin typeface="Times New Roman" panose="02020603050405020304" pitchFamily="18" charset="0"/>
+              <a:cs typeface="Times New Roman" panose="02020603050405020304" pitchFamily="18" charset="0"/>
+            </a:endParaRPr>
+          </a:p>
+          <a:p>
+            <a:pPr marL="0" indent="0" algn="just">
               <a:buNone/>
             </a:pPr>
             <a:r>
@@ -6113,9 +6079,13 @@
               </a:rPr>
               <a:t>- Strong correlation between particulate pollutants.</a:t>
             </a:r>
-          </a:p>
-          <a:p>
-            <a:pPr marL="0" indent="0">
+            <a:endParaRPr sz="2000" dirty="0">
+              <a:latin typeface="Times New Roman" panose="02020603050405020304" pitchFamily="18" charset="0"/>
+              <a:cs typeface="Times New Roman" panose="02020603050405020304" pitchFamily="18" charset="0"/>
+            </a:endParaRPr>
+          </a:p>
+          <a:p>
+            <a:pPr marL="0" indent="0" algn="just">
               <a:buNone/>
             </a:pPr>
             <a:r>
@@ -6125,9 +6095,13 @@
               </a:rPr>
               <a:t>- Metro cities face higher pollution burden.</a:t>
             </a:r>
-          </a:p>
-          <a:p>
-            <a:pPr marL="0" indent="0">
+            <a:endParaRPr sz="2000" dirty="0">
+              <a:latin typeface="Times New Roman" panose="02020603050405020304" pitchFamily="18" charset="0"/>
+              <a:cs typeface="Times New Roman" panose="02020603050405020304" pitchFamily="18" charset="0"/>
+            </a:endParaRPr>
+          </a:p>
+          <a:p>
+            <a:pPr marL="0" indent="0" algn="just">
               <a:buNone/>
             </a:pPr>
             <a:r>
@@ -6137,9 +6111,13 @@
               </a:rPr>
               <a:t>- Seasonal and temporal patterns are significant.</a:t>
             </a:r>
-          </a:p>
-          <a:p>
-            <a:pPr marL="0" indent="0">
+            <a:endParaRPr sz="2000" dirty="0">
+              <a:latin typeface="Times New Roman" panose="02020603050405020304" pitchFamily="18" charset="0"/>
+              <a:cs typeface="Times New Roman" panose="02020603050405020304" pitchFamily="18" charset="0"/>
+            </a:endParaRPr>
+          </a:p>
+          <a:p>
+            <a:pPr marL="0" indent="0" algn="just">
               <a:buNone/>
             </a:pPr>
             <a:r>
@@ -6149,6 +6127,10 @@
               </a:rPr>
               <a:t>- Insights can support environmental monitoring &amp; policymaking.</a:t>
             </a:r>
+            <a:endParaRPr sz="2000" dirty="0">
+              <a:latin typeface="Times New Roman" panose="02020603050405020304" pitchFamily="18" charset="0"/>
+              <a:cs typeface="Times New Roman" panose="02020603050405020304" pitchFamily="18" charset="0"/>
+            </a:endParaRPr>
           </a:p>
         </p:txBody>
       </p:sp>
@@ -6196,6 +6178,7 @@
               <a:rPr dirty="0"/>
               <a:t>Dataset Information</a:t>
             </a:r>
+            <a:endParaRPr dirty="0"/>
           </a:p>
         </p:txBody>
       </p:sp>
@@ -6212,7 +6195,7 @@
         <p:spPr/>
         <p:txBody>
           <a:bodyPr>
-            <a:normAutofit fontScale="92500" lnSpcReduction="20000"/>
+            <a:normAutofit fontScale="72500"/>
           </a:bodyPr>
           <a:lstStyle/>
           <a:p>
@@ -6231,8 +6214,22 @@
                 <a:latin typeface="Times New Roman" panose="02020603050405020304" pitchFamily="18" charset="0"/>
                 <a:cs typeface="Times New Roman" panose="02020603050405020304" pitchFamily="18" charset="0"/>
               </a:rPr>
-              <a:t>Dataset Source: [Mention your dataset source or portal]</a:t>
-            </a:r>
+              <a:t>Dataset Source: </a:t>
+            </a:r>
+            <a:r>
+              <a:rPr lang="en-US" altLang="en-US" sz="2000" u="sng" dirty="0">
+                <a:solidFill>
+                  <a:srgbClr val="0070C0"/>
+                </a:solidFill>
+                <a:latin typeface="Times New Roman" panose="02020603050405020304" pitchFamily="18" charset="0"/>
+                <a:cs typeface="Times New Roman" panose="02020603050405020304" pitchFamily="18" charset="0"/>
+              </a:rPr>
+              <a:t>https://www.data.gov.in/resource/real-time-air-quality-index-various-locations</a:t>
+            </a:r>
+            <a:endParaRPr lang="en-US" altLang="en-US" sz="2000" dirty="0">
+              <a:latin typeface="Times New Roman" panose="02020603050405020304" pitchFamily="18" charset="0"/>
+              <a:cs typeface="Times New Roman" panose="02020603050405020304" pitchFamily="18" charset="0"/>
+            </a:endParaRPr>
           </a:p>
           <a:p>
             <a:pPr marL="0" indent="0">
@@ -6250,8 +6247,19 @@
                 <a:latin typeface="Times New Roman" panose="02020603050405020304" pitchFamily="18" charset="0"/>
                 <a:cs typeface="Times New Roman" panose="02020603050405020304" pitchFamily="18" charset="0"/>
               </a:rPr>
-              <a:t>Number of Records: ~[fill in after cleaning]</a:t>
-            </a:r>
+              <a:t>Number of Records: ~</a:t>
+            </a:r>
+            <a:r>
+              <a:rPr lang="en-US" sz="2000" dirty="0">
+                <a:latin typeface="Times New Roman" panose="02020603050405020304" pitchFamily="18" charset="0"/>
+                <a:cs typeface="Times New Roman" panose="02020603050405020304" pitchFamily="18" charset="0"/>
+              </a:rPr>
+              <a:t>3,100</a:t>
+            </a:r>
+            <a:endParaRPr sz="2000" dirty="0">
+              <a:latin typeface="Times New Roman" panose="02020603050405020304" pitchFamily="18" charset="0"/>
+              <a:cs typeface="Times New Roman" panose="02020603050405020304" pitchFamily="18" charset="0"/>
+            </a:endParaRPr>
           </a:p>
           <a:p>
             <a:pPr marL="0" indent="0">
@@ -6271,6 +6279,10 @@
               </a:rPr>
               <a:t>Columns:</a:t>
             </a:r>
+            <a:endParaRPr sz="2000" dirty="0">
+              <a:latin typeface="Times New Roman" panose="02020603050405020304" pitchFamily="18" charset="0"/>
+              <a:cs typeface="Times New Roman" panose="02020603050405020304" pitchFamily="18" charset="0"/>
+            </a:endParaRPr>
           </a:p>
           <a:p>
             <a:pPr marL="0" indent="0">
@@ -6297,6 +6309,10 @@
               </a:rPr>
               <a:t>City → Name of the city where AQI is recorded</a:t>
             </a:r>
+            <a:endParaRPr sz="2000" dirty="0">
+              <a:latin typeface="Times New Roman" panose="02020603050405020304" pitchFamily="18" charset="0"/>
+              <a:cs typeface="Times New Roman" panose="02020603050405020304" pitchFamily="18" charset="0"/>
+            </a:endParaRPr>
           </a:p>
           <a:p>
             <a:pPr marL="0" indent="0">
@@ -6337,6 +6353,10 @@
               </a:rPr>
               <a:t>NO2, CO, O3, SO2)</a:t>
             </a:r>
+            <a:endParaRPr sz="2000" dirty="0">
+              <a:latin typeface="Times New Roman" panose="02020603050405020304" pitchFamily="18" charset="0"/>
+              <a:cs typeface="Times New Roman" panose="02020603050405020304" pitchFamily="18" charset="0"/>
+            </a:endParaRPr>
           </a:p>
           <a:p>
             <a:pPr marL="0" indent="0">
@@ -6370,6 +6390,10 @@
               </a:rPr>
               <a:t> → Average concentration values</a:t>
             </a:r>
+            <a:endParaRPr sz="2000" dirty="0">
+              <a:latin typeface="Times New Roman" panose="02020603050405020304" pitchFamily="18" charset="0"/>
+              <a:cs typeface="Times New Roman" panose="02020603050405020304" pitchFamily="18" charset="0"/>
+            </a:endParaRPr>
           </a:p>
           <a:p>
             <a:pPr marL="0" indent="0">
@@ -6396,6 +6420,10 @@
               </a:rPr>
               <a:t>Date → Timestamp of measurement</a:t>
             </a:r>
+            <a:endParaRPr sz="2000" dirty="0">
+              <a:latin typeface="Times New Roman" panose="02020603050405020304" pitchFamily="18" charset="0"/>
+              <a:cs typeface="Times New Roman" panose="02020603050405020304" pitchFamily="18" charset="0"/>
+            </a:endParaRPr>
           </a:p>
           <a:p>
             <a:pPr marL="0" indent="0">
@@ -6415,6 +6443,10 @@
               </a:rPr>
               <a:t>Objective: To analyze air quality patterns and pollutant behavior across cities.</a:t>
             </a:r>
+            <a:endParaRPr sz="2000" dirty="0">
+              <a:latin typeface="Times New Roman" panose="02020603050405020304" pitchFamily="18" charset="0"/>
+              <a:cs typeface="Times New Roman" panose="02020603050405020304" pitchFamily="18" charset="0"/>
+            </a:endParaRPr>
           </a:p>
         </p:txBody>
       </p:sp>
@@ -6467,6 +6499,10 @@
               </a:rPr>
               <a:t>Initial Analysis</a:t>
             </a:r>
+            <a:endParaRPr dirty="0">
+              <a:latin typeface="Times New Roman" panose="02020603050405020304" pitchFamily="18" charset="0"/>
+              <a:cs typeface="Times New Roman" panose="02020603050405020304" pitchFamily="18" charset="0"/>
+            </a:endParaRPr>
           </a:p>
         </p:txBody>
       </p:sp>
@@ -6502,6 +6538,10 @@
               </a:rPr>
               <a:t>- Checked for missing and invalid values (e.g., 'NA')</a:t>
             </a:r>
+            <a:endParaRPr sz="2000" dirty="0">
+              <a:latin typeface="Times New Roman" panose="02020603050405020304" pitchFamily="18" charset="0"/>
+              <a:cs typeface="Times New Roman" panose="02020603050405020304" pitchFamily="18" charset="0"/>
+            </a:endParaRPr>
           </a:p>
           <a:p>
             <a:pPr marL="0" indent="0" algn="just">
@@ -6514,6 +6554,10 @@
               </a:rPr>
               <a:t>- Replaced/removed nulls and converted columns to numeric types</a:t>
             </a:r>
+            <a:endParaRPr sz="2000" dirty="0">
+              <a:latin typeface="Times New Roman" panose="02020603050405020304" pitchFamily="18" charset="0"/>
+              <a:cs typeface="Times New Roman" panose="02020603050405020304" pitchFamily="18" charset="0"/>
+            </a:endParaRPr>
           </a:p>
           <a:p>
             <a:pPr marL="0" indent="0" algn="just">
@@ -6526,25 +6570,23 @@
               </a:rPr>
               <a:t>- Dataset cleaned and ready for visualization</a:t>
             </a:r>
+            <a:endParaRPr sz="2000" dirty="0">
+              <a:latin typeface="Times New Roman" panose="02020603050405020304" pitchFamily="18" charset="0"/>
+              <a:cs typeface="Times New Roman" panose="02020603050405020304" pitchFamily="18" charset="0"/>
+            </a:endParaRPr>
           </a:p>
         </p:txBody>
       </p:sp>
       <p:pic>
         <p:nvPicPr>
-          <p:cNvPr id="5" name="Picture 4">
-            <a:extLst>
-              <a:ext uri="{FF2B5EF4-FFF2-40B4-BE49-F238E27FC236}">
-                <a16:creationId xmlns:a16="http://schemas.microsoft.com/office/drawing/2014/main" id="{E7970CDB-3DA6-D6CA-5ACA-6D2F2DA4596D}"/>
-              </a:ext>
-            </a:extLst>
-          </p:cNvPr>
+          <p:cNvPr id="5" name="Picture 4"/>
           <p:cNvPicPr>
             <a:picLocks noChangeAspect="1"/>
           </p:cNvPicPr>
           <p:nvPr/>
         </p:nvPicPr>
         <p:blipFill>
-          <a:blip r:embed="rId2"/>
+          <a:blip r:embed="rId1"/>
           <a:stretch>
             <a:fillRect/>
           </a:stretch>
@@ -6649,6 +6691,7 @@
               <a:rPr lang="en-US" sz="1600" dirty="0"/>
               <a:t>A pie chart was created to show the proportion of different pollutants recorded in the dataset.</a:t>
             </a:r>
+            <a:endParaRPr lang="en-US" sz="1600" dirty="0"/>
           </a:p>
           <a:p>
             <a:pPr>
@@ -6659,6 +6702,7 @@
               <a:rPr lang="en-US" sz="1600" dirty="0"/>
               <a:t>The chart uses percentage values to represent the share of each pollutant.</a:t>
             </a:r>
+            <a:endParaRPr lang="en-US" sz="1600" dirty="0"/>
           </a:p>
           <a:p>
             <a:r>
@@ -6676,6 +6720,7 @@
               <a:rPr lang="en-US" sz="1600" dirty="0"/>
               <a:t>The dataset contains multiple pollutants, each contributing a different proportion to the overall records.</a:t>
             </a:r>
+            <a:endParaRPr lang="en-US" sz="1600" dirty="0"/>
           </a:p>
           <a:p>
             <a:pPr>
@@ -6694,6 +6739,7 @@
               <a:rPr lang="en-US" sz="1600" dirty="0"/>
               <a:t>) may dominate the dataset, highlighting their frequent monitoring.</a:t>
             </a:r>
+            <a:endParaRPr lang="en-US" sz="1600" dirty="0"/>
           </a:p>
           <a:p>
             <a:pPr>
@@ -6712,6 +6758,7 @@
               <a:rPr lang="en-US" sz="1600" dirty="0"/>
               <a:t>) still provide important insights into air quality.</a:t>
             </a:r>
+            <a:endParaRPr lang="en-US" sz="1600" dirty="0"/>
           </a:p>
           <a:p>
             <a:pPr>
@@ -6722,25 +6769,20 @@
               <a:rPr lang="en-US" sz="1600" dirty="0"/>
               <a:t>This helps identify which pollutants are most commonly tracked and potentially most concerning.</a:t>
             </a:r>
+            <a:endParaRPr lang="en-US" sz="1600" dirty="0"/>
           </a:p>
         </p:txBody>
       </p:sp>
       <p:pic>
         <p:nvPicPr>
-          <p:cNvPr id="5" name="Picture 4">
-            <a:extLst>
-              <a:ext uri="{FF2B5EF4-FFF2-40B4-BE49-F238E27FC236}">
-                <a16:creationId xmlns:a16="http://schemas.microsoft.com/office/drawing/2014/main" id="{E7DE0502-F227-36B8-1882-78F537586A6E}"/>
-              </a:ext>
-            </a:extLst>
-          </p:cNvPr>
+          <p:cNvPr id="5" name="Picture 4"/>
           <p:cNvPicPr>
             <a:picLocks noChangeAspect="1"/>
           </p:cNvPicPr>
           <p:nvPr/>
         </p:nvPicPr>
         <p:blipFill>
-          <a:blip r:embed="rId2"/>
+          <a:blip r:embed="rId1"/>
           <a:stretch>
             <a:fillRect/>
           </a:stretch>
@@ -6802,6 +6844,10 @@
               </a:rPr>
               <a:t>Top Polluted Cities</a:t>
             </a:r>
+            <a:endParaRPr dirty="0">
+              <a:latin typeface="Times New Roman" panose="02020603050405020304" pitchFamily="18" charset="0"/>
+              <a:cs typeface="Times New Roman" panose="02020603050405020304" pitchFamily="18" charset="0"/>
+            </a:endParaRPr>
           </a:p>
         </p:txBody>
       </p:sp>
@@ -6837,6 +6883,10 @@
               </a:rPr>
               <a:t>- Bar Plot / Ranking Table</a:t>
             </a:r>
+            <a:endParaRPr sz="2000" dirty="0">
+              <a:latin typeface="Times New Roman" panose="02020603050405020304" pitchFamily="18" charset="0"/>
+              <a:cs typeface="Times New Roman" panose="02020603050405020304" pitchFamily="18" charset="0"/>
+            </a:endParaRPr>
           </a:p>
           <a:p>
             <a:pPr marL="0" indent="0">
@@ -6849,6 +6899,10 @@
               </a:rPr>
               <a:t>- Explanation: Cities with highest average pollutant concentrations.</a:t>
             </a:r>
+            <a:endParaRPr sz="2000" dirty="0">
+              <a:latin typeface="Times New Roman" panose="02020603050405020304" pitchFamily="18" charset="0"/>
+              <a:cs typeface="Times New Roman" panose="02020603050405020304" pitchFamily="18" charset="0"/>
+            </a:endParaRPr>
           </a:p>
           <a:p>
             <a:pPr marL="0" indent="0">
@@ -6861,6 +6915,10 @@
               </a:rPr>
               <a:t>- Insights:</a:t>
             </a:r>
+            <a:endParaRPr sz="2000" dirty="0">
+              <a:latin typeface="Times New Roman" panose="02020603050405020304" pitchFamily="18" charset="0"/>
+              <a:cs typeface="Times New Roman" panose="02020603050405020304" pitchFamily="18" charset="0"/>
+            </a:endParaRPr>
           </a:p>
           <a:p>
             <a:pPr marL="0" indent="0">
@@ -6873,6 +6931,10 @@
               </a:rPr>
               <a:t>• Identifies pollution hotspots.</a:t>
             </a:r>
+            <a:endParaRPr sz="2000" dirty="0">
+              <a:latin typeface="Times New Roman" panose="02020603050405020304" pitchFamily="18" charset="0"/>
+              <a:cs typeface="Times New Roman" panose="02020603050405020304" pitchFamily="18" charset="0"/>
+            </a:endParaRPr>
           </a:p>
           <a:p>
             <a:pPr marL="0" indent="0">
@@ -6885,25 +6947,23 @@
               </a:rPr>
               <a:t>• Useful for policymaking and awareness campaigns.</a:t>
             </a:r>
+            <a:endParaRPr sz="2000" dirty="0">
+              <a:latin typeface="Times New Roman" panose="02020603050405020304" pitchFamily="18" charset="0"/>
+              <a:cs typeface="Times New Roman" panose="02020603050405020304" pitchFamily="18" charset="0"/>
+            </a:endParaRPr>
           </a:p>
         </p:txBody>
       </p:sp>
       <p:pic>
         <p:nvPicPr>
-          <p:cNvPr id="5" name="Picture 4">
-            <a:extLst>
-              <a:ext uri="{FF2B5EF4-FFF2-40B4-BE49-F238E27FC236}">
-                <a16:creationId xmlns:a16="http://schemas.microsoft.com/office/drawing/2014/main" id="{B869726F-F71B-272F-250F-4C9C556D7100}"/>
-              </a:ext>
-            </a:extLst>
-          </p:cNvPr>
+          <p:cNvPr id="5" name="Picture 4"/>
           <p:cNvPicPr>
             <a:picLocks noChangeAspect="1"/>
           </p:cNvPicPr>
           <p:nvPr/>
         </p:nvPicPr>
         <p:blipFill>
-          <a:blip r:embed="rId2"/>
+          <a:blip r:embed="rId1"/>
           <a:stretch>
             <a:fillRect/>
           </a:stretch>
@@ -6965,6 +7025,10 @@
               </a:rPr>
               <a:t>Correlation Heatmap</a:t>
             </a:r>
+            <a:endParaRPr dirty="0">
+              <a:latin typeface="Times New Roman" panose="02020603050405020304" pitchFamily="18" charset="0"/>
+              <a:cs typeface="Times New Roman" panose="02020603050405020304" pitchFamily="18" charset="0"/>
+            </a:endParaRPr>
           </a:p>
         </p:txBody>
       </p:sp>
@@ -7016,6 +7080,10 @@
               </a:rPr>
               <a:t>- Insights:</a:t>
             </a:r>
+            <a:endParaRPr lang="en-IN" sz="2000" dirty="0">
+              <a:latin typeface="Times New Roman" panose="02020603050405020304" pitchFamily="18" charset="0"/>
+              <a:cs typeface="Times New Roman" panose="02020603050405020304" pitchFamily="18" charset="0"/>
+            </a:endParaRPr>
           </a:p>
           <a:p>
             <a:pPr marL="0" indent="0">
@@ -7028,6 +7096,10 @@
               </a:rPr>
               <a:t> • Strong correlation observed between PM2.5 &amp; PM10.</a:t>
             </a:r>
+            <a:endParaRPr sz="2000" dirty="0">
+              <a:latin typeface="Times New Roman" panose="02020603050405020304" pitchFamily="18" charset="0"/>
+              <a:cs typeface="Times New Roman" panose="02020603050405020304" pitchFamily="18" charset="0"/>
+            </a:endParaRPr>
           </a:p>
           <a:p>
             <a:pPr marL="0" indent="0">
@@ -7040,25 +7112,23 @@
               </a:rPr>
               <a:t> • Weak correlation between gases (CO, O3, SO2) and particulate matter.</a:t>
             </a:r>
+            <a:endParaRPr sz="2000" dirty="0">
+              <a:latin typeface="Times New Roman" panose="02020603050405020304" pitchFamily="18" charset="0"/>
+              <a:cs typeface="Times New Roman" panose="02020603050405020304" pitchFamily="18" charset="0"/>
+            </a:endParaRPr>
           </a:p>
         </p:txBody>
       </p:sp>
       <p:pic>
         <p:nvPicPr>
-          <p:cNvPr id="5" name="Picture 4">
-            <a:extLst>
-              <a:ext uri="{FF2B5EF4-FFF2-40B4-BE49-F238E27FC236}">
-                <a16:creationId xmlns:a16="http://schemas.microsoft.com/office/drawing/2014/main" id="{E25A7176-5B7A-CD2B-2BE0-852BCE64B9CB}"/>
-              </a:ext>
-            </a:extLst>
-          </p:cNvPr>
+          <p:cNvPr id="5" name="Picture 4"/>
           <p:cNvPicPr>
             <a:picLocks noChangeAspect="1"/>
           </p:cNvPicPr>
           <p:nvPr/>
         </p:nvPicPr>
         <p:blipFill>
-          <a:blip r:embed="rId2"/>
+          <a:blip r:embed="rId1"/>
           <a:stretch>
             <a:fillRect/>
           </a:stretch>
@@ -7120,6 +7190,10 @@
               </a:rPr>
               <a:t>Distribution of Pollutant Levels</a:t>
             </a:r>
+            <a:endParaRPr dirty="0">
+              <a:latin typeface="Times New Roman" panose="02020603050405020304" pitchFamily="18" charset="0"/>
+              <a:cs typeface="Times New Roman" panose="02020603050405020304" pitchFamily="18" charset="0"/>
+            </a:endParaRPr>
           </a:p>
         </p:txBody>
       </p:sp>
@@ -7155,6 +7229,10 @@
               </a:rPr>
               <a:t>- Histogram </a:t>
             </a:r>
+            <a:endParaRPr sz="2000" dirty="0">
+              <a:latin typeface="Times New Roman" panose="02020603050405020304" pitchFamily="18" charset="0"/>
+              <a:cs typeface="Times New Roman" panose="02020603050405020304" pitchFamily="18" charset="0"/>
+            </a:endParaRPr>
           </a:p>
           <a:p>
             <a:pPr marL="0" indent="0" algn="just">
@@ -7167,6 +7245,10 @@
               </a:rPr>
               <a:t>- Explanation: Shows how pollutant values are spread across cities.</a:t>
             </a:r>
+            <a:endParaRPr sz="2000" dirty="0">
+              <a:latin typeface="Times New Roman" panose="02020603050405020304" pitchFamily="18" charset="0"/>
+              <a:cs typeface="Times New Roman" panose="02020603050405020304" pitchFamily="18" charset="0"/>
+            </a:endParaRPr>
           </a:p>
           <a:p>
             <a:pPr marL="0" indent="0" algn="just">
@@ -7195,6 +7277,10 @@
               </a:rPr>
               <a:t> • Some pollutants show normal distribution, while others are skewed.</a:t>
             </a:r>
+            <a:endParaRPr lang="en-US" sz="2000" dirty="0">
+              <a:latin typeface="Times New Roman" panose="02020603050405020304" pitchFamily="18" charset="0"/>
+              <a:cs typeface="Times New Roman" panose="02020603050405020304" pitchFamily="18" charset="0"/>
+            </a:endParaRPr>
           </a:p>
           <a:p>
             <a:pPr marL="0" indent="0" algn="just">
@@ -7207,25 +7293,23 @@
               </a:rPr>
               <a:t> • Certain cities face consistently higher pollutant averages.</a:t>
             </a:r>
+            <a:endParaRPr sz="2000" dirty="0">
+              <a:latin typeface="Times New Roman" panose="02020603050405020304" pitchFamily="18" charset="0"/>
+              <a:cs typeface="Times New Roman" panose="02020603050405020304" pitchFamily="18" charset="0"/>
+            </a:endParaRPr>
           </a:p>
         </p:txBody>
       </p:sp>
       <p:pic>
         <p:nvPicPr>
-          <p:cNvPr id="5" name="Picture 4">
-            <a:extLst>
-              <a:ext uri="{FF2B5EF4-FFF2-40B4-BE49-F238E27FC236}">
-                <a16:creationId xmlns:a16="http://schemas.microsoft.com/office/drawing/2014/main" id="{806F1F94-E4AD-6423-DAF2-10145E51BC32}"/>
-              </a:ext>
-            </a:extLst>
-          </p:cNvPr>
+          <p:cNvPr id="5" name="Picture 4"/>
           <p:cNvPicPr>
             <a:picLocks noChangeAspect="1"/>
           </p:cNvPicPr>
           <p:nvPr/>
         </p:nvPicPr>
         <p:blipFill>
-          <a:blip r:embed="rId2"/>
+          <a:blip r:embed="rId1"/>
           <a:stretch>
             <a:fillRect/>
           </a:stretch>
@@ -7287,6 +7371,10 @@
               </a:rPr>
               <a:t>Box Plot of Pollutants</a:t>
             </a:r>
+            <a:endParaRPr>
+              <a:latin typeface="Times New Roman" panose="02020603050405020304" pitchFamily="18" charset="0"/>
+              <a:cs typeface="Times New Roman" panose="02020603050405020304" pitchFamily="18" charset="0"/>
+            </a:endParaRPr>
           </a:p>
         </p:txBody>
       </p:sp>
@@ -7322,6 +7410,10 @@
               </a:rPr>
               <a:t>- Explanation: Spread of pollutants with medians and outliers.</a:t>
             </a:r>
+            <a:endParaRPr sz="2000" dirty="0">
+              <a:latin typeface="Times New Roman" panose="02020603050405020304" pitchFamily="18" charset="0"/>
+              <a:cs typeface="Times New Roman" panose="02020603050405020304" pitchFamily="18" charset="0"/>
+            </a:endParaRPr>
           </a:p>
           <a:p>
             <a:pPr marL="0" indent="0">
@@ -7350,6 +7442,10 @@
               </a:rPr>
               <a:t>• PM2.5 and PM10 have high variability.</a:t>
             </a:r>
+            <a:endParaRPr lang="en-US" sz="2000" dirty="0">
+              <a:latin typeface="Times New Roman" panose="02020603050405020304" pitchFamily="18" charset="0"/>
+              <a:cs typeface="Times New Roman" panose="02020603050405020304" pitchFamily="18" charset="0"/>
+            </a:endParaRPr>
           </a:p>
           <a:p>
             <a:pPr marL="0" indent="0">
@@ -7362,25 +7458,23 @@
               </a:rPr>
               <a:t>• Outliers indicate extreme pollution days.</a:t>
             </a:r>
+            <a:endParaRPr sz="2000" dirty="0">
+              <a:latin typeface="Times New Roman" panose="02020603050405020304" pitchFamily="18" charset="0"/>
+              <a:cs typeface="Times New Roman" panose="02020603050405020304" pitchFamily="18" charset="0"/>
+            </a:endParaRPr>
           </a:p>
         </p:txBody>
       </p:sp>
       <p:pic>
         <p:nvPicPr>
-          <p:cNvPr id="5" name="Picture 4">
-            <a:extLst>
-              <a:ext uri="{FF2B5EF4-FFF2-40B4-BE49-F238E27FC236}">
-                <a16:creationId xmlns:a16="http://schemas.microsoft.com/office/drawing/2014/main" id="{27553F31-40F6-6F3C-B9EB-4AB3096A2DA5}"/>
-              </a:ext>
-            </a:extLst>
-          </p:cNvPr>
+          <p:cNvPr id="5" name="Picture 4"/>
           <p:cNvPicPr>
             <a:picLocks noChangeAspect="1"/>
           </p:cNvPicPr>
           <p:nvPr/>
         </p:nvPicPr>
         <p:blipFill>
-          <a:blip r:embed="rId2"/>
+          <a:blip r:embed="rId1"/>
           <a:stretch>
             <a:fillRect/>
           </a:stretch>
@@ -7485,6 +7579,7 @@
               <a:rPr lang="en-US" sz="1600" dirty="0"/>
               <a:t>A violin plot was used to visualize the distribution and density of pollutant levels for each pollutant type.</a:t>
             </a:r>
+            <a:endParaRPr lang="en-US" sz="1600" dirty="0"/>
           </a:p>
           <a:p>
             <a:pPr>
@@ -7495,6 +7590,7 @@
               <a:rPr lang="en-US" sz="1600" dirty="0"/>
               <a:t>The plot combines features of a box plot with a kernel density estimate, showing both the spread and concentration of values.</a:t>
             </a:r>
+            <a:endParaRPr lang="en-US" sz="1600" dirty="0"/>
           </a:p>
           <a:p>
             <a:r>
@@ -7512,6 +7608,7 @@
               <a:rPr lang="en-US" sz="1600" dirty="0"/>
               <a:t>Pollutant levels vary significantly depending on the pollutant type.</a:t>
             </a:r>
+            <a:endParaRPr lang="en-US" sz="1600" dirty="0"/>
           </a:p>
           <a:p>
             <a:pPr>
@@ -7522,25 +7619,20 @@
               <a:rPr lang="en-US" sz="1600" dirty="0"/>
               <a:t>Wider sections of the violins indicate ranges where pollutant values are more concentrated.</a:t>
             </a:r>
+            <a:endParaRPr lang="en-US" sz="1600" dirty="0"/>
           </a:p>
         </p:txBody>
       </p:sp>
       <p:pic>
         <p:nvPicPr>
-          <p:cNvPr id="5" name="Picture 4">
-            <a:extLst>
-              <a:ext uri="{FF2B5EF4-FFF2-40B4-BE49-F238E27FC236}">
-                <a16:creationId xmlns:a16="http://schemas.microsoft.com/office/drawing/2014/main" id="{2A05F93B-314E-9941-051A-7050C3FFC46F}"/>
-              </a:ext>
-            </a:extLst>
-          </p:cNvPr>
+          <p:cNvPr id="5" name="Picture 4"/>
           <p:cNvPicPr>
             <a:picLocks noChangeAspect="1"/>
           </p:cNvPicPr>
           <p:nvPr/>
         </p:nvPicPr>
         <p:blipFill>
-          <a:blip r:embed="rId2"/>
+          <a:blip r:embed="rId1"/>
           <a:stretch>
             <a:fillRect/>
           </a:stretch>
@@ -7606,7 +7698,7 @@
     </a:clrScheme>
     <a:fontScheme name="Organic">
       <a:majorFont>
-        <a:latin typeface="Garamond" panose="02020404030301010803"/>
+        <a:latin typeface="Garamond"/>
         <a:ea typeface=""/>
         <a:cs typeface=""/>
         <a:font script="Jpan" typeface="ＭＳ Ｐゴシック"/>
@@ -7641,7 +7733,7 @@
         <a:font script="Geor" typeface="Sylfaen"/>
       </a:majorFont>
       <a:minorFont>
-        <a:latin typeface="Garamond" panose="02020404030301010803"/>
+        <a:latin typeface="Garamond"/>
         <a:ea typeface=""/>
         <a:cs typeface=""/>
         <a:font script="Jpan" typeface="ＭＳ Ｐ明朝"/>
@@ -7781,16 +7873,16 @@
         </a:gradFill>
         <a:blipFill>
           <a:blip xmlns:r="http://schemas.openxmlformats.org/officeDocument/2006/relationships" r:embed="rId2"/>
-          <a:stretch/>
+          <a:stretch>
+            <a:fillRect/>
+          </a:stretch>
         </a:blipFill>
       </a:bgFillStyleLst>
     </a:fmtScheme>
   </a:themeElements>
-  <a:objectDefaults/>
-  <a:extraClrSchemeLst/>
   <a:extLst>
     <a:ext uri="{05A4C25C-085E-4340-85A3-A5531E510DB2}">
-      <thm15:themeFamily xmlns:thm15="http://schemas.microsoft.com/office/thememl/2012/main" name="Organic" id="{28CDC826-8792-45C0-861B-85EB3ADEDA33}" vid="{7DAC20F1-423D-49E2-BD0B-50532748BAD0}"/>
+      <thm15:themeFamily xmlns:thm15="http://schemas.microsoft.com/office/thememl/2012/main" name="Office Theme" id="{62F939B6-93AF-4DB8-9C6B-D6C7DFDC589F}" vid="{4A3C46E8-61CC-4603-A589-7422A47A8E4A}"/>
     </a:ext>
   </a:extLst>
 </a:theme>

</xml_diff>